<commit_message>
made functions generic, directories specified in main()
</commit_message>
<xml_diff>
--- a/download_structure.pptx
+++ b/download_structure.pptx
@@ -104,6 +104,11 @@
       </a:defRPr>
     </a:lvl9pPr>
   </p:defaultTextStyle>
+  <p:extLst>
+    <p:ext uri="{EFAFB233-063F-42B5-8137-9DF3F51BA10A}">
+      <p15:sldGuideLst xmlns:p15="http://schemas.microsoft.com/office/powerpoint/2012/main"/>
+    </p:ext>
+  </p:extLst>
 </p:presentation>
 </file>
 
@@ -256,7 +261,7 @@
           <a:p>
             <a:fld id="{A8511FDE-65F3-4047-820A-92A625BF3486}" type="datetimeFigureOut">
               <a:rPr lang="en-GB" smtClean="0"/>
-              <a:t>20/01/2022</a:t>
+              <a:t>21/01/2022</a:t>
             </a:fld>
             <a:endParaRPr lang="en-GB"/>
           </a:p>
@@ -456,7 +461,7 @@
           <a:p>
             <a:fld id="{A8511FDE-65F3-4047-820A-92A625BF3486}" type="datetimeFigureOut">
               <a:rPr lang="en-GB" smtClean="0"/>
-              <a:t>20/01/2022</a:t>
+              <a:t>21/01/2022</a:t>
             </a:fld>
             <a:endParaRPr lang="en-GB"/>
           </a:p>
@@ -666,7 +671,7 @@
           <a:p>
             <a:fld id="{A8511FDE-65F3-4047-820A-92A625BF3486}" type="datetimeFigureOut">
               <a:rPr lang="en-GB" smtClean="0"/>
-              <a:t>20/01/2022</a:t>
+              <a:t>21/01/2022</a:t>
             </a:fld>
             <a:endParaRPr lang="en-GB"/>
           </a:p>
@@ -866,7 +871,7 @@
           <a:p>
             <a:fld id="{A8511FDE-65F3-4047-820A-92A625BF3486}" type="datetimeFigureOut">
               <a:rPr lang="en-GB" smtClean="0"/>
-              <a:t>20/01/2022</a:t>
+              <a:t>21/01/2022</a:t>
             </a:fld>
             <a:endParaRPr lang="en-GB"/>
           </a:p>
@@ -1142,7 +1147,7 @@
           <a:p>
             <a:fld id="{A8511FDE-65F3-4047-820A-92A625BF3486}" type="datetimeFigureOut">
               <a:rPr lang="en-GB" smtClean="0"/>
-              <a:t>20/01/2022</a:t>
+              <a:t>21/01/2022</a:t>
             </a:fld>
             <a:endParaRPr lang="en-GB"/>
           </a:p>
@@ -1410,7 +1415,7 @@
           <a:p>
             <a:fld id="{A8511FDE-65F3-4047-820A-92A625BF3486}" type="datetimeFigureOut">
               <a:rPr lang="en-GB" smtClean="0"/>
-              <a:t>20/01/2022</a:t>
+              <a:t>21/01/2022</a:t>
             </a:fld>
             <a:endParaRPr lang="en-GB"/>
           </a:p>
@@ -1825,7 +1830,7 @@
           <a:p>
             <a:fld id="{A8511FDE-65F3-4047-820A-92A625BF3486}" type="datetimeFigureOut">
               <a:rPr lang="en-GB" smtClean="0"/>
-              <a:t>20/01/2022</a:t>
+              <a:t>21/01/2022</a:t>
             </a:fld>
             <a:endParaRPr lang="en-GB"/>
           </a:p>
@@ -1967,7 +1972,7 @@
           <a:p>
             <a:fld id="{A8511FDE-65F3-4047-820A-92A625BF3486}" type="datetimeFigureOut">
               <a:rPr lang="en-GB" smtClean="0"/>
-              <a:t>20/01/2022</a:t>
+              <a:t>21/01/2022</a:t>
             </a:fld>
             <a:endParaRPr lang="en-GB"/>
           </a:p>
@@ -2080,7 +2085,7 @@
           <a:p>
             <a:fld id="{A8511FDE-65F3-4047-820A-92A625BF3486}" type="datetimeFigureOut">
               <a:rPr lang="en-GB" smtClean="0"/>
-              <a:t>20/01/2022</a:t>
+              <a:t>21/01/2022</a:t>
             </a:fld>
             <a:endParaRPr lang="en-GB"/>
           </a:p>
@@ -2393,7 +2398,7 @@
           <a:p>
             <a:fld id="{A8511FDE-65F3-4047-820A-92A625BF3486}" type="datetimeFigureOut">
               <a:rPr lang="en-GB" smtClean="0"/>
-              <a:t>20/01/2022</a:t>
+              <a:t>21/01/2022</a:t>
             </a:fld>
             <a:endParaRPr lang="en-GB"/>
           </a:p>
@@ -2682,7 +2687,7 @@
           <a:p>
             <a:fld id="{A8511FDE-65F3-4047-820A-92A625BF3486}" type="datetimeFigureOut">
               <a:rPr lang="en-GB" smtClean="0"/>
-              <a:t>20/01/2022</a:t>
+              <a:t>21/01/2022</a:t>
             </a:fld>
             <a:endParaRPr lang="en-GB"/>
           </a:p>
@@ -2925,7 +2930,7 @@
           <a:p>
             <a:fld id="{A8511FDE-65F3-4047-820A-92A625BF3486}" type="datetimeFigureOut">
               <a:rPr lang="en-GB" smtClean="0"/>
-              <a:t>20/01/2022</a:t>
+              <a:t>21/01/2022</a:t>
             </a:fld>
             <a:endParaRPr lang="en-GB"/>
           </a:p>
@@ -6307,8 +6312,8 @@
         </p:nvSpPr>
         <p:spPr>
           <a:xfrm>
-            <a:off x="4018689" y="6069435"/>
-            <a:ext cx="2703817" cy="276999"/>
+            <a:off x="4343982" y="6010712"/>
+            <a:ext cx="1752018" cy="276999"/>
           </a:xfrm>
           <a:prstGeom prst="rect">
             <a:avLst/>
@@ -6328,11 +6333,11 @@
           <a:p>
             <a:r>
               <a:rPr lang="en-GB" sz="1200" dirty="0"/>
-              <a:t>Memory issues when getting </a:t>
+              <a:t>These file are </a:t>
             </a:r>
             <a:r>
               <a:rPr lang="en-GB" sz="1200" dirty="0" err="1"/>
-              <a:t>pixel_array</a:t>
+              <a:t>multiframe</a:t>
             </a:r>
             <a:endParaRPr lang="en-GB" sz="1200" dirty="0"/>
           </a:p>

</xml_diff>